<commit_message>
criando media queries pagina inicial
</commit_message>
<xml_diff>
--- a/materiais-complementares/fluxograma projeto.pptx
+++ b/materiais-complementares/fluxograma projeto.pptx
@@ -130,7 +130,7 @@
   <pc:docChgLst>
     <pc:chgData name="Jessica dos Santos Paiva" userId="7fb23bec-a373-4816-84ee-47119a63df95" providerId="ADAL" clId="{30FA8068-CB00-4672-A466-5E69C074B526}"/>
     <pc:docChg chg="undo custSel addSld delSld modSld sldOrd">
-      <pc:chgData name="Jessica dos Santos Paiva" userId="7fb23bec-a373-4816-84ee-47119a63df95" providerId="ADAL" clId="{30FA8068-CB00-4672-A466-5E69C074B526}" dt="2022-03-20T23:27:56.313" v="980" actId="1076"/>
+      <pc:chgData name="Jessica dos Santos Paiva" userId="7fb23bec-a373-4816-84ee-47119a63df95" providerId="ADAL" clId="{30FA8068-CB00-4672-A466-5E69C074B526}" dt="2022-03-23T13:34:21.751" v="983" actId="208"/>
       <pc:docMkLst>
         <pc:docMk/>
       </pc:docMkLst>
@@ -1401,13 +1401,13 @@
         </pc:picChg>
       </pc:sldChg>
       <pc:sldChg chg="addSp delSp modSp add mod">
-        <pc:chgData name="Jessica dos Santos Paiva" userId="7fb23bec-a373-4816-84ee-47119a63df95" providerId="ADAL" clId="{30FA8068-CB00-4672-A466-5E69C074B526}" dt="2022-03-20T22:45:20.346" v="957" actId="208"/>
+        <pc:chgData name="Jessica dos Santos Paiva" userId="7fb23bec-a373-4816-84ee-47119a63df95" providerId="ADAL" clId="{30FA8068-CB00-4672-A466-5E69C074B526}" dt="2022-03-23T13:34:21.751" v="983" actId="208"/>
         <pc:sldMkLst>
           <pc:docMk/>
           <pc:sldMk cId="369776320" sldId="262"/>
         </pc:sldMkLst>
         <pc:spChg chg="mod">
-          <ac:chgData name="Jessica dos Santos Paiva" userId="7fb23bec-a373-4816-84ee-47119a63df95" providerId="ADAL" clId="{30FA8068-CB00-4672-A466-5E69C074B526}" dt="2022-03-20T22:44:03.671" v="955" actId="2085"/>
+          <ac:chgData name="Jessica dos Santos Paiva" userId="7fb23bec-a373-4816-84ee-47119a63df95" providerId="ADAL" clId="{30FA8068-CB00-4672-A466-5E69C074B526}" dt="2022-03-23T13:34:21.751" v="983" actId="208"/>
           <ac:spMkLst>
             <pc:docMk/>
             <pc:sldMk cId="369776320" sldId="262"/>
@@ -1431,7 +1431,7 @@
           </ac:spMkLst>
         </pc:spChg>
         <pc:spChg chg="add mod">
-          <ac:chgData name="Jessica dos Santos Paiva" userId="7fb23bec-a373-4816-84ee-47119a63df95" providerId="ADAL" clId="{30FA8068-CB00-4672-A466-5E69C074B526}" dt="2022-03-20T22:45:20.346" v="957" actId="208"/>
+          <ac:chgData name="Jessica dos Santos Paiva" userId="7fb23bec-a373-4816-84ee-47119a63df95" providerId="ADAL" clId="{30FA8068-CB00-4672-A466-5E69C074B526}" dt="2022-03-23T13:34:21.751" v="983" actId="208"/>
           <ac:spMkLst>
             <pc:docMk/>
             <pc:sldMk cId="369776320" sldId="262"/>
@@ -1439,7 +1439,7 @@
           </ac:spMkLst>
         </pc:spChg>
         <pc:spChg chg="add mod">
-          <ac:chgData name="Jessica dos Santos Paiva" userId="7fb23bec-a373-4816-84ee-47119a63df95" providerId="ADAL" clId="{30FA8068-CB00-4672-A466-5E69C074B526}" dt="2022-03-20T22:45:20.346" v="957" actId="208"/>
+          <ac:chgData name="Jessica dos Santos Paiva" userId="7fb23bec-a373-4816-84ee-47119a63df95" providerId="ADAL" clId="{30FA8068-CB00-4672-A466-5E69C074B526}" dt="2022-03-23T13:34:21.751" v="983" actId="208"/>
           <ac:spMkLst>
             <pc:docMk/>
             <pc:sldMk cId="369776320" sldId="262"/>
@@ -1447,7 +1447,7 @@
           </ac:spMkLst>
         </pc:spChg>
         <pc:spChg chg="add mod">
-          <ac:chgData name="Jessica dos Santos Paiva" userId="7fb23bec-a373-4816-84ee-47119a63df95" providerId="ADAL" clId="{30FA8068-CB00-4672-A466-5E69C074B526}" dt="2022-03-20T22:45:20.346" v="957" actId="208"/>
+          <ac:chgData name="Jessica dos Santos Paiva" userId="7fb23bec-a373-4816-84ee-47119a63df95" providerId="ADAL" clId="{30FA8068-CB00-4672-A466-5E69C074B526}" dt="2022-03-23T13:34:21.751" v="983" actId="208"/>
           <ac:spMkLst>
             <pc:docMk/>
             <pc:sldMk cId="369776320" sldId="262"/>
@@ -1455,7 +1455,7 @@
           </ac:spMkLst>
         </pc:spChg>
         <pc:spChg chg="add mod">
-          <ac:chgData name="Jessica dos Santos Paiva" userId="7fb23bec-a373-4816-84ee-47119a63df95" providerId="ADAL" clId="{30FA8068-CB00-4672-A466-5E69C074B526}" dt="2022-03-20T22:45:20.346" v="957" actId="208"/>
+          <ac:chgData name="Jessica dos Santos Paiva" userId="7fb23bec-a373-4816-84ee-47119a63df95" providerId="ADAL" clId="{30FA8068-CB00-4672-A466-5E69C074B526}" dt="2022-03-23T13:34:21.751" v="983" actId="208"/>
           <ac:spMkLst>
             <pc:docMk/>
             <pc:sldMk cId="369776320" sldId="262"/>
@@ -1463,7 +1463,7 @@
           </ac:spMkLst>
         </pc:spChg>
         <pc:spChg chg="add mod">
-          <ac:chgData name="Jessica dos Santos Paiva" userId="7fb23bec-a373-4816-84ee-47119a63df95" providerId="ADAL" clId="{30FA8068-CB00-4672-A466-5E69C074B526}" dt="2022-03-20T22:45:20.346" v="957" actId="208"/>
+          <ac:chgData name="Jessica dos Santos Paiva" userId="7fb23bec-a373-4816-84ee-47119a63df95" providerId="ADAL" clId="{30FA8068-CB00-4672-A466-5E69C074B526}" dt="2022-03-23T13:34:21.751" v="983" actId="208"/>
           <ac:spMkLst>
             <pc:docMk/>
             <pc:sldMk cId="369776320" sldId="262"/>
@@ -1471,7 +1471,7 @@
           </ac:spMkLst>
         </pc:spChg>
         <pc:spChg chg="add mod">
-          <ac:chgData name="Jessica dos Santos Paiva" userId="7fb23bec-a373-4816-84ee-47119a63df95" providerId="ADAL" clId="{30FA8068-CB00-4672-A466-5E69C074B526}" dt="2022-03-20T22:45:20.346" v="957" actId="208"/>
+          <ac:chgData name="Jessica dos Santos Paiva" userId="7fb23bec-a373-4816-84ee-47119a63df95" providerId="ADAL" clId="{30FA8068-CB00-4672-A466-5E69C074B526}" dt="2022-03-23T13:34:21.751" v="983" actId="208"/>
           <ac:spMkLst>
             <pc:docMk/>
             <pc:sldMk cId="369776320" sldId="262"/>
@@ -1479,7 +1479,7 @@
           </ac:spMkLst>
         </pc:spChg>
         <pc:spChg chg="add mod">
-          <ac:chgData name="Jessica dos Santos Paiva" userId="7fb23bec-a373-4816-84ee-47119a63df95" providerId="ADAL" clId="{30FA8068-CB00-4672-A466-5E69C074B526}" dt="2022-03-20T22:45:20.346" v="957" actId="208"/>
+          <ac:chgData name="Jessica dos Santos Paiva" userId="7fb23bec-a373-4816-84ee-47119a63df95" providerId="ADAL" clId="{30FA8068-CB00-4672-A466-5E69C074B526}" dt="2022-03-23T13:34:21.751" v="983" actId="208"/>
           <ac:spMkLst>
             <pc:docMk/>
             <pc:sldMk cId="369776320" sldId="262"/>
@@ -1487,7 +1487,7 @@
           </ac:spMkLst>
         </pc:spChg>
         <pc:spChg chg="add mod">
-          <ac:chgData name="Jessica dos Santos Paiva" userId="7fb23bec-a373-4816-84ee-47119a63df95" providerId="ADAL" clId="{30FA8068-CB00-4672-A466-5E69C074B526}" dt="2022-03-20T22:45:20.346" v="957" actId="208"/>
+          <ac:chgData name="Jessica dos Santos Paiva" userId="7fb23bec-a373-4816-84ee-47119a63df95" providerId="ADAL" clId="{30FA8068-CB00-4672-A466-5E69C074B526}" dt="2022-03-23T13:34:21.751" v="983" actId="208"/>
           <ac:spMkLst>
             <pc:docMk/>
             <pc:sldMk cId="369776320" sldId="262"/>
@@ -1503,7 +1503,7 @@
           </ac:spMkLst>
         </pc:spChg>
         <pc:spChg chg="add mod">
-          <ac:chgData name="Jessica dos Santos Paiva" userId="7fb23bec-a373-4816-84ee-47119a63df95" providerId="ADAL" clId="{30FA8068-CB00-4672-A466-5E69C074B526}" dt="2022-03-20T22:45:20.346" v="957" actId="208"/>
+          <ac:chgData name="Jessica dos Santos Paiva" userId="7fb23bec-a373-4816-84ee-47119a63df95" providerId="ADAL" clId="{30FA8068-CB00-4672-A466-5E69C074B526}" dt="2022-03-23T13:34:21.751" v="983" actId="208"/>
           <ac:spMkLst>
             <pc:docMk/>
             <pc:sldMk cId="369776320" sldId="262"/>
@@ -1511,7 +1511,7 @@
           </ac:spMkLst>
         </pc:spChg>
         <pc:spChg chg="add mod">
-          <ac:chgData name="Jessica dos Santos Paiva" userId="7fb23bec-a373-4816-84ee-47119a63df95" providerId="ADAL" clId="{30FA8068-CB00-4672-A466-5E69C074B526}" dt="2022-03-20T22:45:20.346" v="957" actId="208"/>
+          <ac:chgData name="Jessica dos Santos Paiva" userId="7fb23bec-a373-4816-84ee-47119a63df95" providerId="ADAL" clId="{30FA8068-CB00-4672-A466-5E69C074B526}" dt="2022-03-23T13:34:21.751" v="983" actId="208"/>
           <ac:spMkLst>
             <pc:docMk/>
             <pc:sldMk cId="369776320" sldId="262"/>
@@ -1519,7 +1519,7 @@
           </ac:spMkLst>
         </pc:spChg>
         <pc:spChg chg="add mod">
-          <ac:chgData name="Jessica dos Santos Paiva" userId="7fb23bec-a373-4816-84ee-47119a63df95" providerId="ADAL" clId="{30FA8068-CB00-4672-A466-5E69C074B526}" dt="2022-03-20T22:45:20.346" v="957" actId="208"/>
+          <ac:chgData name="Jessica dos Santos Paiva" userId="7fb23bec-a373-4816-84ee-47119a63df95" providerId="ADAL" clId="{30FA8068-CB00-4672-A466-5E69C074B526}" dt="2022-03-23T13:34:21.751" v="983" actId="208"/>
           <ac:spMkLst>
             <pc:docMk/>
             <pc:sldMk cId="369776320" sldId="262"/>
@@ -1527,7 +1527,7 @@
           </ac:spMkLst>
         </pc:spChg>
         <pc:spChg chg="add mod">
-          <ac:chgData name="Jessica dos Santos Paiva" userId="7fb23bec-a373-4816-84ee-47119a63df95" providerId="ADAL" clId="{30FA8068-CB00-4672-A466-5E69C074B526}" dt="2022-03-20T22:45:20.346" v="957" actId="208"/>
+          <ac:chgData name="Jessica dos Santos Paiva" userId="7fb23bec-a373-4816-84ee-47119a63df95" providerId="ADAL" clId="{30FA8068-CB00-4672-A466-5E69C074B526}" dt="2022-03-23T13:34:21.751" v="983" actId="208"/>
           <ac:spMkLst>
             <pc:docMk/>
             <pc:sldMk cId="369776320" sldId="262"/>
@@ -1535,7 +1535,7 @@
           </ac:spMkLst>
         </pc:spChg>
         <pc:spChg chg="add mod">
-          <ac:chgData name="Jessica dos Santos Paiva" userId="7fb23bec-a373-4816-84ee-47119a63df95" providerId="ADAL" clId="{30FA8068-CB00-4672-A466-5E69C074B526}" dt="2022-03-20T22:45:20.346" v="957" actId="208"/>
+          <ac:chgData name="Jessica dos Santos Paiva" userId="7fb23bec-a373-4816-84ee-47119a63df95" providerId="ADAL" clId="{30FA8068-CB00-4672-A466-5E69C074B526}" dt="2022-03-23T13:34:21.751" v="983" actId="208"/>
           <ac:spMkLst>
             <pc:docMk/>
             <pc:sldMk cId="369776320" sldId="262"/>
@@ -1543,7 +1543,7 @@
           </ac:spMkLst>
         </pc:spChg>
         <pc:spChg chg="add mod">
-          <ac:chgData name="Jessica dos Santos Paiva" userId="7fb23bec-a373-4816-84ee-47119a63df95" providerId="ADAL" clId="{30FA8068-CB00-4672-A466-5E69C074B526}" dt="2022-03-20T22:45:20.346" v="957" actId="208"/>
+          <ac:chgData name="Jessica dos Santos Paiva" userId="7fb23bec-a373-4816-84ee-47119a63df95" providerId="ADAL" clId="{30FA8068-CB00-4672-A466-5E69C074B526}" dt="2022-03-23T13:34:21.751" v="983" actId="208"/>
           <ac:spMkLst>
             <pc:docMk/>
             <pc:sldMk cId="369776320" sldId="262"/>
@@ -1551,7 +1551,7 @@
           </ac:spMkLst>
         </pc:spChg>
         <pc:spChg chg="add mod">
-          <ac:chgData name="Jessica dos Santos Paiva" userId="7fb23bec-a373-4816-84ee-47119a63df95" providerId="ADAL" clId="{30FA8068-CB00-4672-A466-5E69C074B526}" dt="2022-03-20T22:45:20.346" v="957" actId="208"/>
+          <ac:chgData name="Jessica dos Santos Paiva" userId="7fb23bec-a373-4816-84ee-47119a63df95" providerId="ADAL" clId="{30FA8068-CB00-4672-A466-5E69C074B526}" dt="2022-03-23T13:34:21.751" v="983" actId="208"/>
           <ac:spMkLst>
             <pc:docMk/>
             <pc:sldMk cId="369776320" sldId="262"/>
@@ -1559,7 +1559,7 @@
           </ac:spMkLst>
         </pc:spChg>
         <pc:spChg chg="add mod">
-          <ac:chgData name="Jessica dos Santos Paiva" userId="7fb23bec-a373-4816-84ee-47119a63df95" providerId="ADAL" clId="{30FA8068-CB00-4672-A466-5E69C074B526}" dt="2022-03-20T22:45:20.346" v="957" actId="208"/>
+          <ac:chgData name="Jessica dos Santos Paiva" userId="7fb23bec-a373-4816-84ee-47119a63df95" providerId="ADAL" clId="{30FA8068-CB00-4672-A466-5E69C074B526}" dt="2022-03-23T13:34:21.751" v="983" actId="208"/>
           <ac:spMkLst>
             <pc:docMk/>
             <pc:sldMk cId="369776320" sldId="262"/>
@@ -1567,7 +1567,7 @@
           </ac:spMkLst>
         </pc:spChg>
         <pc:spChg chg="add mod">
-          <ac:chgData name="Jessica dos Santos Paiva" userId="7fb23bec-a373-4816-84ee-47119a63df95" providerId="ADAL" clId="{30FA8068-CB00-4672-A466-5E69C074B526}" dt="2022-03-20T22:45:20.346" v="957" actId="208"/>
+          <ac:chgData name="Jessica dos Santos Paiva" userId="7fb23bec-a373-4816-84ee-47119a63df95" providerId="ADAL" clId="{30FA8068-CB00-4672-A466-5E69C074B526}" dt="2022-03-23T13:34:21.751" v="983" actId="208"/>
           <ac:spMkLst>
             <pc:docMk/>
             <pc:sldMk cId="369776320" sldId="262"/>
@@ -1575,7 +1575,7 @@
           </ac:spMkLst>
         </pc:spChg>
         <pc:spChg chg="add mod">
-          <ac:chgData name="Jessica dos Santos Paiva" userId="7fb23bec-a373-4816-84ee-47119a63df95" providerId="ADAL" clId="{30FA8068-CB00-4672-A466-5E69C074B526}" dt="2022-03-20T22:45:20.346" v="957" actId="208"/>
+          <ac:chgData name="Jessica dos Santos Paiva" userId="7fb23bec-a373-4816-84ee-47119a63df95" providerId="ADAL" clId="{30FA8068-CB00-4672-A466-5E69C074B526}" dt="2022-03-23T13:34:21.751" v="983" actId="208"/>
           <ac:spMkLst>
             <pc:docMk/>
             <pc:sldMk cId="369776320" sldId="262"/>
@@ -1583,7 +1583,7 @@
           </ac:spMkLst>
         </pc:spChg>
         <pc:spChg chg="add mod">
-          <ac:chgData name="Jessica dos Santos Paiva" userId="7fb23bec-a373-4816-84ee-47119a63df95" providerId="ADAL" clId="{30FA8068-CB00-4672-A466-5E69C074B526}" dt="2022-03-20T22:45:20.346" v="957" actId="208"/>
+          <ac:chgData name="Jessica dos Santos Paiva" userId="7fb23bec-a373-4816-84ee-47119a63df95" providerId="ADAL" clId="{30FA8068-CB00-4672-A466-5E69C074B526}" dt="2022-03-23T13:34:21.751" v="983" actId="208"/>
           <ac:spMkLst>
             <pc:docMk/>
             <pc:sldMk cId="369776320" sldId="262"/>
@@ -1599,7 +1599,7 @@
           </ac:graphicFrameMkLst>
         </pc:graphicFrameChg>
         <pc:cxnChg chg="add mod">
-          <ac:chgData name="Jessica dos Santos Paiva" userId="7fb23bec-a373-4816-84ee-47119a63df95" providerId="ADAL" clId="{30FA8068-CB00-4672-A466-5E69C074B526}" dt="2022-03-20T22:45:20.346" v="957" actId="208"/>
+          <ac:chgData name="Jessica dos Santos Paiva" userId="7fb23bec-a373-4816-84ee-47119a63df95" providerId="ADAL" clId="{30FA8068-CB00-4672-A466-5E69C074B526}" dt="2022-03-23T13:34:21.751" v="983" actId="208"/>
           <ac:cxnSpMkLst>
             <pc:docMk/>
             <pc:sldMk cId="369776320" sldId="262"/>
@@ -1607,7 +1607,7 @@
           </ac:cxnSpMkLst>
         </pc:cxnChg>
         <pc:cxnChg chg="add mod">
-          <ac:chgData name="Jessica dos Santos Paiva" userId="7fb23bec-a373-4816-84ee-47119a63df95" providerId="ADAL" clId="{30FA8068-CB00-4672-A466-5E69C074B526}" dt="2022-03-20T22:45:20.346" v="957" actId="208"/>
+          <ac:chgData name="Jessica dos Santos Paiva" userId="7fb23bec-a373-4816-84ee-47119a63df95" providerId="ADAL" clId="{30FA8068-CB00-4672-A466-5E69C074B526}" dt="2022-03-23T13:34:21.751" v="983" actId="208"/>
           <ac:cxnSpMkLst>
             <pc:docMk/>
             <pc:sldMk cId="369776320" sldId="262"/>
@@ -1615,7 +1615,7 @@
           </ac:cxnSpMkLst>
         </pc:cxnChg>
         <pc:cxnChg chg="add mod">
-          <ac:chgData name="Jessica dos Santos Paiva" userId="7fb23bec-a373-4816-84ee-47119a63df95" providerId="ADAL" clId="{30FA8068-CB00-4672-A466-5E69C074B526}" dt="2022-03-20T22:45:20.346" v="957" actId="208"/>
+          <ac:chgData name="Jessica dos Santos Paiva" userId="7fb23bec-a373-4816-84ee-47119a63df95" providerId="ADAL" clId="{30FA8068-CB00-4672-A466-5E69C074B526}" dt="2022-03-23T13:34:21.751" v="983" actId="208"/>
           <ac:cxnSpMkLst>
             <pc:docMk/>
             <pc:sldMk cId="369776320" sldId="262"/>
@@ -1623,7 +1623,7 @@
           </ac:cxnSpMkLst>
         </pc:cxnChg>
         <pc:cxnChg chg="add mod">
-          <ac:chgData name="Jessica dos Santos Paiva" userId="7fb23bec-a373-4816-84ee-47119a63df95" providerId="ADAL" clId="{30FA8068-CB00-4672-A466-5E69C074B526}" dt="2022-03-20T22:45:20.346" v="957" actId="208"/>
+          <ac:chgData name="Jessica dos Santos Paiva" userId="7fb23bec-a373-4816-84ee-47119a63df95" providerId="ADAL" clId="{30FA8068-CB00-4672-A466-5E69C074B526}" dt="2022-03-23T13:34:21.751" v="983" actId="208"/>
           <ac:cxnSpMkLst>
             <pc:docMk/>
             <pc:sldMk cId="369776320" sldId="262"/>
@@ -1631,7 +1631,7 @@
           </ac:cxnSpMkLst>
         </pc:cxnChg>
         <pc:cxnChg chg="add mod">
-          <ac:chgData name="Jessica dos Santos Paiva" userId="7fb23bec-a373-4816-84ee-47119a63df95" providerId="ADAL" clId="{30FA8068-CB00-4672-A466-5E69C074B526}" dt="2022-03-20T22:45:20.346" v="957" actId="208"/>
+          <ac:chgData name="Jessica dos Santos Paiva" userId="7fb23bec-a373-4816-84ee-47119a63df95" providerId="ADAL" clId="{30FA8068-CB00-4672-A466-5E69C074B526}" dt="2022-03-23T13:34:21.751" v="983" actId="208"/>
           <ac:cxnSpMkLst>
             <pc:docMk/>
             <pc:sldMk cId="369776320" sldId="262"/>
@@ -1639,7 +1639,7 @@
           </ac:cxnSpMkLst>
         </pc:cxnChg>
         <pc:cxnChg chg="add mod">
-          <ac:chgData name="Jessica dos Santos Paiva" userId="7fb23bec-a373-4816-84ee-47119a63df95" providerId="ADAL" clId="{30FA8068-CB00-4672-A466-5E69C074B526}" dt="2022-03-20T22:45:20.346" v="957" actId="208"/>
+          <ac:chgData name="Jessica dos Santos Paiva" userId="7fb23bec-a373-4816-84ee-47119a63df95" providerId="ADAL" clId="{30FA8068-CB00-4672-A466-5E69C074B526}" dt="2022-03-23T13:34:21.751" v="983" actId="208"/>
           <ac:cxnSpMkLst>
             <pc:docMk/>
             <pc:sldMk cId="369776320" sldId="262"/>
@@ -1647,7 +1647,7 @@
           </ac:cxnSpMkLst>
         </pc:cxnChg>
         <pc:cxnChg chg="add mod">
-          <ac:chgData name="Jessica dos Santos Paiva" userId="7fb23bec-a373-4816-84ee-47119a63df95" providerId="ADAL" clId="{30FA8068-CB00-4672-A466-5E69C074B526}" dt="2022-03-20T22:45:20.346" v="957" actId="208"/>
+          <ac:chgData name="Jessica dos Santos Paiva" userId="7fb23bec-a373-4816-84ee-47119a63df95" providerId="ADAL" clId="{30FA8068-CB00-4672-A466-5E69C074B526}" dt="2022-03-23T13:34:21.751" v="983" actId="208"/>
           <ac:cxnSpMkLst>
             <pc:docMk/>
             <pc:sldMk cId="369776320" sldId="262"/>
@@ -1655,7 +1655,7 @@
           </ac:cxnSpMkLst>
         </pc:cxnChg>
         <pc:cxnChg chg="add mod">
-          <ac:chgData name="Jessica dos Santos Paiva" userId="7fb23bec-a373-4816-84ee-47119a63df95" providerId="ADAL" clId="{30FA8068-CB00-4672-A466-5E69C074B526}" dt="2022-03-20T22:45:20.346" v="957" actId="208"/>
+          <ac:chgData name="Jessica dos Santos Paiva" userId="7fb23bec-a373-4816-84ee-47119a63df95" providerId="ADAL" clId="{30FA8068-CB00-4672-A466-5E69C074B526}" dt="2022-03-23T13:34:21.751" v="983" actId="208"/>
           <ac:cxnSpMkLst>
             <pc:docMk/>
             <pc:sldMk cId="369776320" sldId="262"/>
@@ -1663,7 +1663,7 @@
           </ac:cxnSpMkLst>
         </pc:cxnChg>
         <pc:cxnChg chg="add mod">
-          <ac:chgData name="Jessica dos Santos Paiva" userId="7fb23bec-a373-4816-84ee-47119a63df95" providerId="ADAL" clId="{30FA8068-CB00-4672-A466-5E69C074B526}" dt="2022-03-20T22:45:20.346" v="957" actId="208"/>
+          <ac:chgData name="Jessica dos Santos Paiva" userId="7fb23bec-a373-4816-84ee-47119a63df95" providerId="ADAL" clId="{30FA8068-CB00-4672-A466-5E69C074B526}" dt="2022-03-23T13:34:21.751" v="983" actId="208"/>
           <ac:cxnSpMkLst>
             <pc:docMk/>
             <pc:sldMk cId="369776320" sldId="262"/>
@@ -1671,7 +1671,7 @@
           </ac:cxnSpMkLst>
         </pc:cxnChg>
         <pc:cxnChg chg="add mod">
-          <ac:chgData name="Jessica dos Santos Paiva" userId="7fb23bec-a373-4816-84ee-47119a63df95" providerId="ADAL" clId="{30FA8068-CB00-4672-A466-5E69C074B526}" dt="2022-03-20T22:45:20.346" v="957" actId="208"/>
+          <ac:chgData name="Jessica dos Santos Paiva" userId="7fb23bec-a373-4816-84ee-47119a63df95" providerId="ADAL" clId="{30FA8068-CB00-4672-A466-5E69C074B526}" dt="2022-03-23T13:34:21.751" v="983" actId="208"/>
           <ac:cxnSpMkLst>
             <pc:docMk/>
             <pc:sldMk cId="369776320" sldId="262"/>
@@ -1679,7 +1679,7 @@
           </ac:cxnSpMkLst>
         </pc:cxnChg>
         <pc:cxnChg chg="add mod">
-          <ac:chgData name="Jessica dos Santos Paiva" userId="7fb23bec-a373-4816-84ee-47119a63df95" providerId="ADAL" clId="{30FA8068-CB00-4672-A466-5E69C074B526}" dt="2022-03-20T22:45:20.346" v="957" actId="208"/>
+          <ac:chgData name="Jessica dos Santos Paiva" userId="7fb23bec-a373-4816-84ee-47119a63df95" providerId="ADAL" clId="{30FA8068-CB00-4672-A466-5E69C074B526}" dt="2022-03-23T13:34:21.751" v="983" actId="208"/>
           <ac:cxnSpMkLst>
             <pc:docMk/>
             <pc:sldMk cId="369776320" sldId="262"/>
@@ -1687,7 +1687,7 @@
           </ac:cxnSpMkLst>
         </pc:cxnChg>
         <pc:cxnChg chg="add mod">
-          <ac:chgData name="Jessica dos Santos Paiva" userId="7fb23bec-a373-4816-84ee-47119a63df95" providerId="ADAL" clId="{30FA8068-CB00-4672-A466-5E69C074B526}" dt="2022-03-20T22:45:20.346" v="957" actId="208"/>
+          <ac:chgData name="Jessica dos Santos Paiva" userId="7fb23bec-a373-4816-84ee-47119a63df95" providerId="ADAL" clId="{30FA8068-CB00-4672-A466-5E69C074B526}" dt="2022-03-23T13:34:21.751" v="983" actId="208"/>
           <ac:cxnSpMkLst>
             <pc:docMk/>
             <pc:sldMk cId="369776320" sldId="262"/>
@@ -1695,7 +1695,7 @@
           </ac:cxnSpMkLst>
         </pc:cxnChg>
         <pc:cxnChg chg="add mod">
-          <ac:chgData name="Jessica dos Santos Paiva" userId="7fb23bec-a373-4816-84ee-47119a63df95" providerId="ADAL" clId="{30FA8068-CB00-4672-A466-5E69C074B526}" dt="2022-03-20T22:45:20.346" v="957" actId="208"/>
+          <ac:chgData name="Jessica dos Santos Paiva" userId="7fb23bec-a373-4816-84ee-47119a63df95" providerId="ADAL" clId="{30FA8068-CB00-4672-A466-5E69C074B526}" dt="2022-03-23T13:34:21.751" v="983" actId="208"/>
           <ac:cxnSpMkLst>
             <pc:docMk/>
             <pc:sldMk cId="369776320" sldId="262"/>
@@ -1703,7 +1703,7 @@
           </ac:cxnSpMkLst>
         </pc:cxnChg>
         <pc:cxnChg chg="add mod">
-          <ac:chgData name="Jessica dos Santos Paiva" userId="7fb23bec-a373-4816-84ee-47119a63df95" providerId="ADAL" clId="{30FA8068-CB00-4672-A466-5E69C074B526}" dt="2022-03-20T22:45:20.346" v="957" actId="208"/>
+          <ac:chgData name="Jessica dos Santos Paiva" userId="7fb23bec-a373-4816-84ee-47119a63df95" providerId="ADAL" clId="{30FA8068-CB00-4672-A466-5E69C074B526}" dt="2022-03-23T13:34:21.751" v="983" actId="208"/>
           <ac:cxnSpMkLst>
             <pc:docMk/>
             <pc:sldMk cId="369776320" sldId="262"/>
@@ -1711,7 +1711,7 @@
           </ac:cxnSpMkLst>
         </pc:cxnChg>
         <pc:cxnChg chg="add mod">
-          <ac:chgData name="Jessica dos Santos Paiva" userId="7fb23bec-a373-4816-84ee-47119a63df95" providerId="ADAL" clId="{30FA8068-CB00-4672-A466-5E69C074B526}" dt="2022-03-20T22:45:20.346" v="957" actId="208"/>
+          <ac:chgData name="Jessica dos Santos Paiva" userId="7fb23bec-a373-4816-84ee-47119a63df95" providerId="ADAL" clId="{30FA8068-CB00-4672-A466-5E69C074B526}" dt="2022-03-23T13:34:21.751" v="983" actId="208"/>
           <ac:cxnSpMkLst>
             <pc:docMk/>
             <pc:sldMk cId="369776320" sldId="262"/>
@@ -1719,7 +1719,7 @@
           </ac:cxnSpMkLst>
         </pc:cxnChg>
         <pc:cxnChg chg="add mod">
-          <ac:chgData name="Jessica dos Santos Paiva" userId="7fb23bec-a373-4816-84ee-47119a63df95" providerId="ADAL" clId="{30FA8068-CB00-4672-A466-5E69C074B526}" dt="2022-03-20T22:45:20.346" v="957" actId="208"/>
+          <ac:chgData name="Jessica dos Santos Paiva" userId="7fb23bec-a373-4816-84ee-47119a63df95" providerId="ADAL" clId="{30FA8068-CB00-4672-A466-5E69C074B526}" dt="2022-03-23T13:34:21.751" v="983" actId="208"/>
           <ac:cxnSpMkLst>
             <pc:docMk/>
             <pc:sldMk cId="369776320" sldId="262"/>
@@ -1727,7 +1727,7 @@
           </ac:cxnSpMkLst>
         </pc:cxnChg>
         <pc:cxnChg chg="add mod">
-          <ac:chgData name="Jessica dos Santos Paiva" userId="7fb23bec-a373-4816-84ee-47119a63df95" providerId="ADAL" clId="{30FA8068-CB00-4672-A466-5E69C074B526}" dt="2022-03-20T22:45:20.346" v="957" actId="208"/>
+          <ac:chgData name="Jessica dos Santos Paiva" userId="7fb23bec-a373-4816-84ee-47119a63df95" providerId="ADAL" clId="{30FA8068-CB00-4672-A466-5E69C074B526}" dt="2022-03-23T13:34:21.751" v="983" actId="208"/>
           <ac:cxnSpMkLst>
             <pc:docMk/>
             <pc:sldMk cId="369776320" sldId="262"/>
@@ -1735,7 +1735,7 @@
           </ac:cxnSpMkLst>
         </pc:cxnChg>
         <pc:cxnChg chg="add mod">
-          <ac:chgData name="Jessica dos Santos Paiva" userId="7fb23bec-a373-4816-84ee-47119a63df95" providerId="ADAL" clId="{30FA8068-CB00-4672-A466-5E69C074B526}" dt="2022-03-20T22:45:20.346" v="957" actId="208"/>
+          <ac:chgData name="Jessica dos Santos Paiva" userId="7fb23bec-a373-4816-84ee-47119a63df95" providerId="ADAL" clId="{30FA8068-CB00-4672-A466-5E69C074B526}" dt="2022-03-23T13:34:21.751" v="983" actId="208"/>
           <ac:cxnSpMkLst>
             <pc:docMk/>
             <pc:sldMk cId="369776320" sldId="262"/>
@@ -1743,7 +1743,7 @@
           </ac:cxnSpMkLst>
         </pc:cxnChg>
         <pc:cxnChg chg="add mod">
-          <ac:chgData name="Jessica dos Santos Paiva" userId="7fb23bec-a373-4816-84ee-47119a63df95" providerId="ADAL" clId="{30FA8068-CB00-4672-A466-5E69C074B526}" dt="2022-03-20T22:45:20.346" v="957" actId="208"/>
+          <ac:chgData name="Jessica dos Santos Paiva" userId="7fb23bec-a373-4816-84ee-47119a63df95" providerId="ADAL" clId="{30FA8068-CB00-4672-A466-5E69C074B526}" dt="2022-03-23T13:34:21.751" v="983" actId="208"/>
           <ac:cxnSpMkLst>
             <pc:docMk/>
             <pc:sldMk cId="369776320" sldId="262"/>
@@ -1751,7 +1751,7 @@
           </ac:cxnSpMkLst>
         </pc:cxnChg>
         <pc:cxnChg chg="add mod">
-          <ac:chgData name="Jessica dos Santos Paiva" userId="7fb23bec-a373-4816-84ee-47119a63df95" providerId="ADAL" clId="{30FA8068-CB00-4672-A466-5E69C074B526}" dt="2022-03-20T22:45:20.346" v="957" actId="208"/>
+          <ac:chgData name="Jessica dos Santos Paiva" userId="7fb23bec-a373-4816-84ee-47119a63df95" providerId="ADAL" clId="{30FA8068-CB00-4672-A466-5E69C074B526}" dt="2022-03-23T13:34:21.751" v="983" actId="208"/>
           <ac:cxnSpMkLst>
             <pc:docMk/>
             <pc:sldMk cId="369776320" sldId="262"/>
@@ -1759,7 +1759,7 @@
           </ac:cxnSpMkLst>
         </pc:cxnChg>
         <pc:cxnChg chg="add mod">
-          <ac:chgData name="Jessica dos Santos Paiva" userId="7fb23bec-a373-4816-84ee-47119a63df95" providerId="ADAL" clId="{30FA8068-CB00-4672-A466-5E69C074B526}" dt="2022-03-20T22:45:20.346" v="957" actId="208"/>
+          <ac:chgData name="Jessica dos Santos Paiva" userId="7fb23bec-a373-4816-84ee-47119a63df95" providerId="ADAL" clId="{30FA8068-CB00-4672-A466-5E69C074B526}" dt="2022-03-23T13:34:21.751" v="983" actId="208"/>
           <ac:cxnSpMkLst>
             <pc:docMk/>
             <pc:sldMk cId="369776320" sldId="262"/>
@@ -1767,7 +1767,7 @@
           </ac:cxnSpMkLst>
         </pc:cxnChg>
         <pc:cxnChg chg="add mod">
-          <ac:chgData name="Jessica dos Santos Paiva" userId="7fb23bec-a373-4816-84ee-47119a63df95" providerId="ADAL" clId="{30FA8068-CB00-4672-A466-5E69C074B526}" dt="2022-03-20T22:45:20.346" v="957" actId="208"/>
+          <ac:chgData name="Jessica dos Santos Paiva" userId="7fb23bec-a373-4816-84ee-47119a63df95" providerId="ADAL" clId="{30FA8068-CB00-4672-A466-5E69C074B526}" dt="2022-03-23T13:34:21.751" v="983" actId="208"/>
           <ac:cxnSpMkLst>
             <pc:docMk/>
             <pc:sldMk cId="369776320" sldId="262"/>
@@ -1775,7 +1775,7 @@
           </ac:cxnSpMkLst>
         </pc:cxnChg>
         <pc:cxnChg chg="add mod">
-          <ac:chgData name="Jessica dos Santos Paiva" userId="7fb23bec-a373-4816-84ee-47119a63df95" providerId="ADAL" clId="{30FA8068-CB00-4672-A466-5E69C074B526}" dt="2022-03-20T22:45:20.346" v="957" actId="208"/>
+          <ac:chgData name="Jessica dos Santos Paiva" userId="7fb23bec-a373-4816-84ee-47119a63df95" providerId="ADAL" clId="{30FA8068-CB00-4672-A466-5E69C074B526}" dt="2022-03-23T13:34:21.751" v="983" actId="208"/>
           <ac:cxnSpMkLst>
             <pc:docMk/>
             <pc:sldMk cId="369776320" sldId="262"/>
@@ -1783,7 +1783,7 @@
           </ac:cxnSpMkLst>
         </pc:cxnChg>
         <pc:cxnChg chg="add mod">
-          <ac:chgData name="Jessica dos Santos Paiva" userId="7fb23bec-a373-4816-84ee-47119a63df95" providerId="ADAL" clId="{30FA8068-CB00-4672-A466-5E69C074B526}" dt="2022-03-20T22:45:20.346" v="957" actId="208"/>
+          <ac:chgData name="Jessica dos Santos Paiva" userId="7fb23bec-a373-4816-84ee-47119a63df95" providerId="ADAL" clId="{30FA8068-CB00-4672-A466-5E69C074B526}" dt="2022-03-23T13:34:21.751" v="983" actId="208"/>
           <ac:cxnSpMkLst>
             <pc:docMk/>
             <pc:sldMk cId="369776320" sldId="262"/>
@@ -1791,7 +1791,7 @@
           </ac:cxnSpMkLst>
         </pc:cxnChg>
         <pc:cxnChg chg="add mod">
-          <ac:chgData name="Jessica dos Santos Paiva" userId="7fb23bec-a373-4816-84ee-47119a63df95" providerId="ADAL" clId="{30FA8068-CB00-4672-A466-5E69C074B526}" dt="2022-03-20T22:45:20.346" v="957" actId="208"/>
+          <ac:chgData name="Jessica dos Santos Paiva" userId="7fb23bec-a373-4816-84ee-47119a63df95" providerId="ADAL" clId="{30FA8068-CB00-4672-A466-5E69C074B526}" dt="2022-03-23T13:34:21.751" v="983" actId="208"/>
           <ac:cxnSpMkLst>
             <pc:docMk/>
             <pc:sldMk cId="369776320" sldId="262"/>
@@ -1799,7 +1799,7 @@
           </ac:cxnSpMkLst>
         </pc:cxnChg>
         <pc:cxnChg chg="add mod">
-          <ac:chgData name="Jessica dos Santos Paiva" userId="7fb23bec-a373-4816-84ee-47119a63df95" providerId="ADAL" clId="{30FA8068-CB00-4672-A466-5E69C074B526}" dt="2022-03-20T22:45:20.346" v="957" actId="208"/>
+          <ac:chgData name="Jessica dos Santos Paiva" userId="7fb23bec-a373-4816-84ee-47119a63df95" providerId="ADAL" clId="{30FA8068-CB00-4672-A466-5E69C074B526}" dt="2022-03-23T13:34:21.751" v="983" actId="208"/>
           <ac:cxnSpMkLst>
             <pc:docMk/>
             <pc:sldMk cId="369776320" sldId="262"/>
@@ -1807,7 +1807,7 @@
           </ac:cxnSpMkLst>
         </pc:cxnChg>
         <pc:cxnChg chg="add mod">
-          <ac:chgData name="Jessica dos Santos Paiva" userId="7fb23bec-a373-4816-84ee-47119a63df95" providerId="ADAL" clId="{30FA8068-CB00-4672-A466-5E69C074B526}" dt="2022-03-20T22:45:20.346" v="957" actId="208"/>
+          <ac:chgData name="Jessica dos Santos Paiva" userId="7fb23bec-a373-4816-84ee-47119a63df95" providerId="ADAL" clId="{30FA8068-CB00-4672-A466-5E69C074B526}" dt="2022-03-23T13:34:21.751" v="983" actId="208"/>
           <ac:cxnSpMkLst>
             <pc:docMk/>
             <pc:sldMk cId="369776320" sldId="262"/>
@@ -1816,7 +1816,7 @@
         </pc:cxnChg>
       </pc:sldChg>
       <pc:sldChg chg="addSp delSp modSp add mod ord">
-        <pc:chgData name="Jessica dos Santos Paiva" userId="7fb23bec-a373-4816-84ee-47119a63df95" providerId="ADAL" clId="{30FA8068-CB00-4672-A466-5E69C074B526}" dt="2022-03-20T23:27:56.313" v="980" actId="1076"/>
+        <pc:chgData name="Jessica dos Santos Paiva" userId="7fb23bec-a373-4816-84ee-47119a63df95" providerId="ADAL" clId="{30FA8068-CB00-4672-A466-5E69C074B526}" dt="2022-03-23T11:42:50.063" v="982" actId="1076"/>
         <pc:sldMkLst>
           <pc:docMk/>
           <pc:sldMk cId="2331715668" sldId="263"/>
@@ -1918,7 +1918,7 @@
           </ac:graphicFrameMkLst>
         </pc:graphicFrameChg>
         <pc:picChg chg="add mod">
-          <ac:chgData name="Jessica dos Santos Paiva" userId="7fb23bec-a373-4816-84ee-47119a63df95" providerId="ADAL" clId="{30FA8068-CB00-4672-A466-5E69C074B526}" dt="2022-03-20T23:27:56.313" v="980" actId="1076"/>
+          <ac:chgData name="Jessica dos Santos Paiva" userId="7fb23bec-a373-4816-84ee-47119a63df95" providerId="ADAL" clId="{30FA8068-CB00-4672-A466-5E69C074B526}" dt="2022-03-23T11:42:17.197" v="981" actId="1076"/>
           <ac:picMkLst>
             <pc:docMk/>
             <pc:sldMk cId="2331715668" sldId="263"/>
@@ -1950,7 +1950,7 @@
           </ac:picMkLst>
         </pc:picChg>
         <pc:picChg chg="add mod">
-          <ac:chgData name="Jessica dos Santos Paiva" userId="7fb23bec-a373-4816-84ee-47119a63df95" providerId="ADAL" clId="{30FA8068-CB00-4672-A466-5E69C074B526}" dt="2022-03-20T22:46:40.669" v="965" actId="1076"/>
+          <ac:chgData name="Jessica dos Santos Paiva" userId="7fb23bec-a373-4816-84ee-47119a63df95" providerId="ADAL" clId="{30FA8068-CB00-4672-A466-5E69C074B526}" dt="2022-03-23T11:42:50.063" v="982" actId="1076"/>
           <ac:picMkLst>
             <pc:docMk/>
             <pc:sldMk cId="2331715668" sldId="263"/>
@@ -2144,7 +2144,7 @@
           <a:p>
             <a:fld id="{B1D53C1D-A57C-4A8A-8A30-043BEBA7B76F}" type="datetimeFigureOut">
               <a:rPr lang="en-US" smtClean="0"/>
-              <a:t>3/20/2022</a:t>
+              <a:t>3/23/2022</a:t>
             </a:fld>
             <a:endParaRPr lang="en-US"/>
           </a:p>
@@ -2344,7 +2344,7 @@
           <a:p>
             <a:fld id="{B1D53C1D-A57C-4A8A-8A30-043BEBA7B76F}" type="datetimeFigureOut">
               <a:rPr lang="en-US" smtClean="0"/>
-              <a:t>3/20/2022</a:t>
+              <a:t>3/23/2022</a:t>
             </a:fld>
             <a:endParaRPr lang="en-US"/>
           </a:p>
@@ -2554,7 +2554,7 @@
           <a:p>
             <a:fld id="{B1D53C1D-A57C-4A8A-8A30-043BEBA7B76F}" type="datetimeFigureOut">
               <a:rPr lang="en-US" smtClean="0"/>
-              <a:t>3/20/2022</a:t>
+              <a:t>3/23/2022</a:t>
             </a:fld>
             <a:endParaRPr lang="en-US"/>
           </a:p>
@@ -2754,7 +2754,7 @@
           <a:p>
             <a:fld id="{B1D53C1D-A57C-4A8A-8A30-043BEBA7B76F}" type="datetimeFigureOut">
               <a:rPr lang="en-US" smtClean="0"/>
-              <a:t>3/20/2022</a:t>
+              <a:t>3/23/2022</a:t>
             </a:fld>
             <a:endParaRPr lang="en-US"/>
           </a:p>
@@ -3030,7 +3030,7 @@
           <a:p>
             <a:fld id="{B1D53C1D-A57C-4A8A-8A30-043BEBA7B76F}" type="datetimeFigureOut">
               <a:rPr lang="en-US" smtClean="0"/>
-              <a:t>3/20/2022</a:t>
+              <a:t>3/23/2022</a:t>
             </a:fld>
             <a:endParaRPr lang="en-US"/>
           </a:p>
@@ -3298,7 +3298,7 @@
           <a:p>
             <a:fld id="{B1D53C1D-A57C-4A8A-8A30-043BEBA7B76F}" type="datetimeFigureOut">
               <a:rPr lang="en-US" smtClean="0"/>
-              <a:t>3/20/2022</a:t>
+              <a:t>3/23/2022</a:t>
             </a:fld>
             <a:endParaRPr lang="en-US"/>
           </a:p>
@@ -3713,7 +3713,7 @@
           <a:p>
             <a:fld id="{B1D53C1D-A57C-4A8A-8A30-043BEBA7B76F}" type="datetimeFigureOut">
               <a:rPr lang="en-US" smtClean="0"/>
-              <a:t>3/20/2022</a:t>
+              <a:t>3/23/2022</a:t>
             </a:fld>
             <a:endParaRPr lang="en-US"/>
           </a:p>
@@ -3855,7 +3855,7 @@
           <a:p>
             <a:fld id="{B1D53C1D-A57C-4A8A-8A30-043BEBA7B76F}" type="datetimeFigureOut">
               <a:rPr lang="en-US" smtClean="0"/>
-              <a:t>3/20/2022</a:t>
+              <a:t>3/23/2022</a:t>
             </a:fld>
             <a:endParaRPr lang="en-US"/>
           </a:p>
@@ -3968,7 +3968,7 @@
           <a:p>
             <a:fld id="{B1D53C1D-A57C-4A8A-8A30-043BEBA7B76F}" type="datetimeFigureOut">
               <a:rPr lang="en-US" smtClean="0"/>
-              <a:t>3/20/2022</a:t>
+              <a:t>3/23/2022</a:t>
             </a:fld>
             <a:endParaRPr lang="en-US"/>
           </a:p>
@@ -4281,7 +4281,7 @@
           <a:p>
             <a:fld id="{B1D53C1D-A57C-4A8A-8A30-043BEBA7B76F}" type="datetimeFigureOut">
               <a:rPr lang="en-US" smtClean="0"/>
-              <a:t>3/20/2022</a:t>
+              <a:t>3/23/2022</a:t>
             </a:fld>
             <a:endParaRPr lang="en-US"/>
           </a:p>
@@ -4570,7 +4570,7 @@
           <a:p>
             <a:fld id="{B1D53C1D-A57C-4A8A-8A30-043BEBA7B76F}" type="datetimeFigureOut">
               <a:rPr lang="en-US" smtClean="0"/>
-              <a:t>3/20/2022</a:t>
+              <a:t>3/23/2022</a:t>
             </a:fld>
             <a:endParaRPr lang="en-US"/>
           </a:p>
@@ -4813,7 +4813,7 @@
           <a:p>
             <a:fld id="{B1D53C1D-A57C-4A8A-8A30-043BEBA7B76F}" type="datetimeFigureOut">
               <a:rPr lang="en-US" smtClean="0"/>
-              <a:t>3/20/2022</a:t>
+              <a:t>3/23/2022</a:t>
             </a:fld>
             <a:endParaRPr lang="en-US"/>
           </a:p>
@@ -7449,7 +7449,11 @@
           </a:xfrm>
           <a:noFill/>
           <a:ln>
-            <a:noFill/>
+            <a:solidFill>
+              <a:schemeClr val="accent2">
+                <a:lumMod val="50000"/>
+              </a:schemeClr>
+            </a:solidFill>
           </a:ln>
         </p:spPr>
         <p:txBody>
@@ -7666,7 +7670,9 @@
           </a:prstGeom>
           <a:ln>
             <a:solidFill>
-              <a:schemeClr val="bg1"/>
+              <a:schemeClr val="accent2">
+                <a:lumMod val="50000"/>
+              </a:schemeClr>
             </a:solidFill>
             <a:tailEnd type="triangle"/>
           </a:ln>
@@ -7713,7 +7719,9 @@
           </a:solidFill>
           <a:ln>
             <a:solidFill>
-              <a:schemeClr val="bg1"/>
+              <a:schemeClr val="accent2">
+                <a:lumMod val="50000"/>
+              </a:schemeClr>
             </a:solidFill>
           </a:ln>
         </p:spPr>
@@ -7772,7 +7780,9 @@
           </a:prstGeom>
           <a:ln>
             <a:solidFill>
-              <a:schemeClr val="bg1"/>
+              <a:schemeClr val="accent2">
+                <a:lumMod val="50000"/>
+              </a:schemeClr>
             </a:solidFill>
             <a:tailEnd type="triangle"/>
           </a:ln>
@@ -7819,7 +7829,9 @@
           </a:solidFill>
           <a:ln>
             <a:solidFill>
-              <a:schemeClr val="bg1"/>
+              <a:schemeClr val="accent2">
+                <a:lumMod val="50000"/>
+              </a:schemeClr>
             </a:solidFill>
           </a:ln>
         </p:spPr>
@@ -7878,7 +7890,9 @@
           </a:prstGeom>
           <a:ln>
             <a:solidFill>
-              <a:schemeClr val="bg1"/>
+              <a:schemeClr val="accent2">
+                <a:lumMod val="50000"/>
+              </a:schemeClr>
             </a:solidFill>
             <a:tailEnd type="triangle"/>
           </a:ln>
@@ -7924,7 +7938,9 @@
           </a:prstGeom>
           <a:ln>
             <a:solidFill>
-              <a:schemeClr val="bg1"/>
+              <a:schemeClr val="accent2">
+                <a:lumMod val="50000"/>
+              </a:schemeClr>
             </a:solidFill>
             <a:tailEnd type="triangle"/>
           </a:ln>
@@ -7970,7 +7986,9 @@
           </a:prstGeom>
           <a:ln>
             <a:solidFill>
-              <a:schemeClr val="bg1"/>
+              <a:schemeClr val="accent2">
+                <a:lumMod val="50000"/>
+              </a:schemeClr>
             </a:solidFill>
             <a:tailEnd type="triangle"/>
           </a:ln>
@@ -8017,7 +8035,9 @@
           </a:solidFill>
           <a:ln>
             <a:solidFill>
-              <a:schemeClr val="bg1"/>
+              <a:schemeClr val="accent2">
+                <a:lumMod val="50000"/>
+              </a:schemeClr>
             </a:solidFill>
           </a:ln>
         </p:spPr>
@@ -8077,7 +8097,9 @@
           </a:solidFill>
           <a:ln>
             <a:solidFill>
-              <a:schemeClr val="bg1"/>
+              <a:schemeClr val="accent2">
+                <a:lumMod val="50000"/>
+              </a:schemeClr>
             </a:solidFill>
           </a:ln>
         </p:spPr>
@@ -8137,7 +8159,9 @@
           </a:solidFill>
           <a:ln>
             <a:solidFill>
-              <a:schemeClr val="bg1"/>
+              <a:schemeClr val="accent2">
+                <a:lumMod val="50000"/>
+              </a:schemeClr>
             </a:solidFill>
           </a:ln>
         </p:spPr>
@@ -8197,7 +8221,9 @@
           </a:solidFill>
           <a:ln>
             <a:solidFill>
-              <a:schemeClr val="bg1"/>
+              <a:schemeClr val="accent2">
+                <a:lumMod val="50000"/>
+              </a:schemeClr>
             </a:solidFill>
           </a:ln>
         </p:spPr>
@@ -8257,7 +8283,9 @@
           </a:solidFill>
           <a:ln>
             <a:solidFill>
-              <a:schemeClr val="bg1"/>
+              <a:schemeClr val="accent2">
+                <a:lumMod val="50000"/>
+              </a:schemeClr>
             </a:solidFill>
           </a:ln>
         </p:spPr>
@@ -8317,7 +8345,9 @@
           </a:solidFill>
           <a:ln>
             <a:solidFill>
-              <a:schemeClr val="bg1"/>
+              <a:schemeClr val="accent2">
+                <a:lumMod val="50000"/>
+              </a:schemeClr>
             </a:solidFill>
           </a:ln>
         </p:spPr>
@@ -8437,7 +8467,9 @@
           </a:solidFill>
           <a:ln>
             <a:solidFill>
-              <a:schemeClr val="bg1"/>
+              <a:schemeClr val="accent2">
+                <a:lumMod val="50000"/>
+              </a:schemeClr>
             </a:solidFill>
           </a:ln>
         </p:spPr>
@@ -8497,7 +8529,9 @@
           </a:solidFill>
           <a:ln>
             <a:solidFill>
-              <a:schemeClr val="bg1"/>
+              <a:schemeClr val="accent2">
+                <a:lumMod val="50000"/>
+              </a:schemeClr>
             </a:solidFill>
           </a:ln>
         </p:spPr>
@@ -8557,7 +8591,9 @@
           </a:solidFill>
           <a:ln>
             <a:solidFill>
-              <a:schemeClr val="bg1"/>
+              <a:schemeClr val="accent2">
+                <a:lumMod val="50000"/>
+              </a:schemeClr>
             </a:solidFill>
           </a:ln>
         </p:spPr>
@@ -8615,7 +8651,9 @@
           </a:prstGeom>
           <a:ln>
             <a:solidFill>
-              <a:schemeClr val="bg1"/>
+              <a:schemeClr val="accent2">
+                <a:lumMod val="50000"/>
+              </a:schemeClr>
             </a:solidFill>
             <a:tailEnd type="triangle"/>
           </a:ln>
@@ -8660,7 +8698,9 @@
           </a:prstGeom>
           <a:ln>
             <a:solidFill>
-              <a:schemeClr val="bg1"/>
+              <a:schemeClr val="accent2">
+                <a:lumMod val="50000"/>
+              </a:schemeClr>
             </a:solidFill>
             <a:tailEnd type="triangle"/>
           </a:ln>
@@ -8705,7 +8745,9 @@
           </a:prstGeom>
           <a:ln>
             <a:solidFill>
-              <a:schemeClr val="bg1"/>
+              <a:schemeClr val="accent2">
+                <a:lumMod val="50000"/>
+              </a:schemeClr>
             </a:solidFill>
             <a:tailEnd type="triangle"/>
           </a:ln>
@@ -8750,7 +8792,9 @@
           </a:prstGeom>
           <a:ln>
             <a:solidFill>
-              <a:schemeClr val="bg1"/>
+              <a:schemeClr val="accent2">
+                <a:lumMod val="50000"/>
+              </a:schemeClr>
             </a:solidFill>
             <a:tailEnd type="triangle"/>
           </a:ln>
@@ -8795,7 +8839,9 @@
           </a:prstGeom>
           <a:ln>
             <a:solidFill>
-              <a:schemeClr val="bg1"/>
+              <a:schemeClr val="accent2">
+                <a:lumMod val="50000"/>
+              </a:schemeClr>
             </a:solidFill>
             <a:tailEnd type="triangle"/>
           </a:ln>
@@ -8841,7 +8887,9 @@
           </a:prstGeom>
           <a:ln>
             <a:solidFill>
-              <a:schemeClr val="bg1"/>
+              <a:schemeClr val="accent2">
+                <a:lumMod val="50000"/>
+              </a:schemeClr>
             </a:solidFill>
             <a:tailEnd type="triangle"/>
           </a:ln>
@@ -8886,7 +8934,9 @@
           </a:prstGeom>
           <a:ln>
             <a:solidFill>
-              <a:schemeClr val="bg1"/>
+              <a:schemeClr val="accent2">
+                <a:lumMod val="50000"/>
+              </a:schemeClr>
             </a:solidFill>
             <a:tailEnd type="triangle"/>
           </a:ln>
@@ -8934,7 +8984,9 @@
           </a:prstGeom>
           <a:ln>
             <a:solidFill>
-              <a:schemeClr val="bg1"/>
+              <a:schemeClr val="accent2">
+                <a:lumMod val="50000"/>
+              </a:schemeClr>
             </a:solidFill>
             <a:tailEnd type="triangle"/>
           </a:ln>
@@ -8980,7 +9032,9 @@
           </a:prstGeom>
           <a:ln>
             <a:solidFill>
-              <a:schemeClr val="bg1"/>
+              <a:schemeClr val="accent2">
+                <a:lumMod val="50000"/>
+              </a:schemeClr>
             </a:solidFill>
             <a:tailEnd type="triangle"/>
           </a:ln>
@@ -9026,7 +9080,9 @@
           </a:prstGeom>
           <a:ln>
             <a:solidFill>
-              <a:schemeClr val="bg1"/>
+              <a:schemeClr val="accent2">
+                <a:lumMod val="50000"/>
+              </a:schemeClr>
             </a:solidFill>
             <a:tailEnd type="triangle"/>
           </a:ln>
@@ -9073,7 +9129,9 @@
           </a:solidFill>
           <a:ln>
             <a:solidFill>
-              <a:schemeClr val="bg1"/>
+              <a:schemeClr val="accent2">
+                <a:lumMod val="50000"/>
+              </a:schemeClr>
             </a:solidFill>
           </a:ln>
         </p:spPr>
@@ -9133,7 +9191,9 @@
           </a:solidFill>
           <a:ln>
             <a:solidFill>
-              <a:schemeClr val="bg1"/>
+              <a:schemeClr val="accent2">
+                <a:lumMod val="50000"/>
+              </a:schemeClr>
             </a:solidFill>
           </a:ln>
         </p:spPr>
@@ -9193,7 +9253,9 @@
           </a:solidFill>
           <a:ln>
             <a:solidFill>
-              <a:schemeClr val="bg1"/>
+              <a:schemeClr val="accent2">
+                <a:lumMod val="50000"/>
+              </a:schemeClr>
             </a:solidFill>
           </a:ln>
         </p:spPr>
@@ -9253,7 +9315,9 @@
           </a:solidFill>
           <a:ln>
             <a:solidFill>
-              <a:schemeClr val="bg1"/>
+              <a:schemeClr val="accent2">
+                <a:lumMod val="50000"/>
+              </a:schemeClr>
             </a:solidFill>
           </a:ln>
         </p:spPr>
@@ -9313,7 +9377,9 @@
           </a:solidFill>
           <a:ln>
             <a:solidFill>
-              <a:schemeClr val="bg1"/>
+              <a:schemeClr val="accent2">
+                <a:lumMod val="50000"/>
+              </a:schemeClr>
             </a:solidFill>
           </a:ln>
         </p:spPr>
@@ -9372,7 +9438,9 @@
           </a:prstGeom>
           <a:ln>
             <a:solidFill>
-              <a:schemeClr val="bg1"/>
+              <a:schemeClr val="accent2">
+                <a:lumMod val="50000"/>
+              </a:schemeClr>
             </a:solidFill>
             <a:tailEnd type="triangle"/>
           </a:ln>
@@ -9418,7 +9486,9 @@
           </a:prstGeom>
           <a:ln>
             <a:solidFill>
-              <a:schemeClr val="bg1"/>
+              <a:schemeClr val="accent2">
+                <a:lumMod val="50000"/>
+              </a:schemeClr>
             </a:solidFill>
             <a:tailEnd type="triangle"/>
           </a:ln>
@@ -9465,7 +9535,9 @@
           </a:solidFill>
           <a:ln>
             <a:solidFill>
-              <a:schemeClr val="bg1"/>
+              <a:schemeClr val="accent2">
+                <a:lumMod val="50000"/>
+              </a:schemeClr>
             </a:solidFill>
           </a:ln>
         </p:spPr>
@@ -9524,7 +9596,9 @@
           </a:prstGeom>
           <a:ln>
             <a:solidFill>
-              <a:schemeClr val="bg1"/>
+              <a:schemeClr val="accent2">
+                <a:lumMod val="50000"/>
+              </a:schemeClr>
             </a:solidFill>
             <a:tailEnd type="triangle"/>
           </a:ln>
@@ -9570,7 +9644,9 @@
           </a:prstGeom>
           <a:ln>
             <a:solidFill>
-              <a:schemeClr val="bg1"/>
+              <a:schemeClr val="accent2">
+                <a:lumMod val="50000"/>
+              </a:schemeClr>
             </a:solidFill>
             <a:tailEnd type="triangle"/>
           </a:ln>
@@ -9617,7 +9693,9 @@
           </a:solidFill>
           <a:ln>
             <a:solidFill>
-              <a:schemeClr val="bg1"/>
+              <a:schemeClr val="accent2">
+                <a:lumMod val="50000"/>
+              </a:schemeClr>
             </a:solidFill>
           </a:ln>
         </p:spPr>
@@ -9676,7 +9754,9 @@
           </a:prstGeom>
           <a:ln>
             <a:solidFill>
-              <a:schemeClr val="bg1"/>
+              <a:schemeClr val="accent2">
+                <a:lumMod val="50000"/>
+              </a:schemeClr>
             </a:solidFill>
             <a:tailEnd type="triangle"/>
           </a:ln>
@@ -9723,7 +9803,9 @@
           </a:solidFill>
           <a:ln>
             <a:solidFill>
-              <a:schemeClr val="bg1"/>
+              <a:schemeClr val="accent2">
+                <a:lumMod val="50000"/>
+              </a:schemeClr>
             </a:solidFill>
           </a:ln>
         </p:spPr>
@@ -9782,7 +9864,9 @@
           </a:prstGeom>
           <a:ln>
             <a:solidFill>
-              <a:schemeClr val="bg1"/>
+              <a:schemeClr val="accent2">
+                <a:lumMod val="50000"/>
+              </a:schemeClr>
             </a:solidFill>
             <a:tailEnd type="triangle"/>
           </a:ln>
@@ -9828,7 +9912,9 @@
           </a:prstGeom>
           <a:ln>
             <a:solidFill>
-              <a:schemeClr val="bg1"/>
+              <a:schemeClr val="accent2">
+                <a:lumMod val="50000"/>
+              </a:schemeClr>
             </a:solidFill>
             <a:tailEnd type="triangle"/>
           </a:ln>
@@ -9876,7 +9962,9 @@
           </a:prstGeom>
           <a:ln>
             <a:solidFill>
-              <a:schemeClr val="bg1"/>
+              <a:schemeClr val="accent2">
+                <a:lumMod val="50000"/>
+              </a:schemeClr>
             </a:solidFill>
             <a:tailEnd type="triangle"/>
           </a:ln>
@@ -9922,7 +10010,9 @@
           </a:prstGeom>
           <a:ln>
             <a:solidFill>
-              <a:schemeClr val="bg1"/>
+              <a:schemeClr val="accent2">
+                <a:lumMod val="50000"/>
+              </a:schemeClr>
             </a:solidFill>
             <a:tailEnd type="triangle"/>
           </a:ln>
@@ -9968,7 +10058,9 @@
           </a:prstGeom>
           <a:ln>
             <a:solidFill>
-              <a:schemeClr val="bg1"/>
+              <a:schemeClr val="accent2">
+                <a:lumMod val="50000"/>
+              </a:schemeClr>
             </a:solidFill>
             <a:tailEnd type="triangle"/>
           </a:ln>
@@ -10014,7 +10106,9 @@
           </a:prstGeom>
           <a:ln>
             <a:solidFill>
-              <a:schemeClr val="bg1"/>
+              <a:schemeClr val="accent2">
+                <a:lumMod val="50000"/>
+              </a:schemeClr>
             </a:solidFill>
             <a:tailEnd type="triangle"/>
           </a:ln>
@@ -10060,7 +10154,9 @@
           </a:prstGeom>
           <a:ln>
             <a:solidFill>
-              <a:schemeClr val="bg1"/>
+              <a:schemeClr val="accent2">
+                <a:lumMod val="50000"/>
+              </a:schemeClr>
             </a:solidFill>
             <a:tailEnd type="triangle"/>
           </a:ln>
@@ -10767,7 +10863,7 @@
         </p:blipFill>
         <p:spPr>
           <a:xfrm>
-            <a:off x="5062538" y="2392925"/>
+            <a:off x="5062538" y="2392924"/>
             <a:ext cx="1757361" cy="938182"/>
           </a:xfrm>
           <a:prstGeom prst="rect">
@@ -10929,7 +11025,7 @@
         </p:blipFill>
         <p:spPr>
           <a:xfrm>
-            <a:off x="4057818" y="4582890"/>
+            <a:off x="4036218" y="4577866"/>
             <a:ext cx="2261505" cy="1089442"/>
           </a:xfrm>
           <a:prstGeom prst="rect">

</xml_diff>